<commit_message>
Last version: slides for coqpl 2024
</commit_message>
<xml_diff>
--- a/grapheditor/2024-coqpl/main.pptx
+++ b/grapheditor/2024-coqpl/main.pptx
@@ -3312,7 +3312,7 @@
           <a:p>
             <a:fld id="{2580D0C4-C4D4-4DF8-B7B8-734EF432FA45}" type="datetimeFigureOut">
               <a:rPr lang="fr-FR" smtClean="0"/>
-              <a:t>18/01/2024</a:t>
+              <a:t>20/01/2024</a:t>
             </a:fld>
             <a:endParaRPr lang="fr-FR"/>
           </a:p>
@@ -3493,7 +3493,7 @@
           <a:p>
             <a:fld id="{C1C5544D-24DB-489C-AA38-E91C5DDD72D1}" type="datetimeFigureOut">
               <a:rPr lang="fr-FR" smtClean="0"/>
-              <a:t>18/01/2024</a:t>
+              <a:t>20/01/2024</a:t>
             </a:fld>
             <a:endParaRPr lang="fr-FR"/>
           </a:p>
@@ -3806,292 +3806,7 @@
           <a:bodyPr/>
           <a:lstStyle/>
           <a:p>
-            <a:r>
-              <a:rPr lang="en-US"/>
-              <a:t>Bonjour, je </a:t>
-            </a:r>
-            <a:r>
-              <a:rPr lang="en-US" err="1"/>
-              <a:t>vais</a:t>
-            </a:r>
-            <a:r>
-              <a:rPr lang="en-US"/>
-              <a:t> </a:t>
-            </a:r>
-            <a:r>
-              <a:rPr lang="en-US" err="1"/>
-              <a:t>vous</a:t>
-            </a:r>
-            <a:r>
-              <a:rPr lang="en-US"/>
-              <a:t> presenter </a:t>
-            </a:r>
-            <a:r>
-              <a:rPr lang="en-US" err="1"/>
-              <a:t>mon</a:t>
-            </a:r>
-            <a:r>
-              <a:rPr lang="en-US"/>
-              <a:t> </a:t>
-            </a:r>
-            <a:r>
-              <a:rPr lang="en-US" err="1"/>
-              <a:t>porfil</a:t>
-            </a:r>
-            <a:r>
-              <a:rPr lang="en-US"/>
-              <a:t> </a:t>
-            </a:r>
-            <a:r>
-              <a:rPr lang="en-US" err="1"/>
-              <a:t>autour</a:t>
-            </a:r>
-            <a:r>
-              <a:rPr lang="en-US"/>
-              <a:t> des </a:t>
-            </a:r>
-            <a:r>
-              <a:rPr lang="en-US" err="1"/>
-              <a:t>langages</a:t>
-            </a:r>
-            <a:r>
-              <a:rPr lang="en-US"/>
-              <a:t> et </a:t>
-            </a:r>
-            <a:r>
-              <a:rPr lang="en-US" err="1"/>
-              <a:t>preuves</a:t>
-            </a:r>
-            <a:r>
-              <a:rPr lang="en-US"/>
-              <a:t> </a:t>
-            </a:r>
-            <a:r>
-              <a:rPr lang="en-US" err="1"/>
-              <a:t>mécanisées</a:t>
-            </a:r>
-            <a:r>
-              <a:rPr lang="en-US"/>
-              <a:t> pour un poste de </a:t>
-            </a:r>
-            <a:r>
-              <a:rPr lang="en-US" err="1"/>
-              <a:t>charche</a:t>
-            </a:r>
-            <a:r>
-              <a:rPr lang="en-US"/>
-              <a:t> de recherche de </a:t>
-            </a:r>
-            <a:r>
-              <a:rPr lang="en-US" err="1"/>
-              <a:t>classe</a:t>
-            </a:r>
-            <a:r>
-              <a:rPr lang="en-US"/>
-              <a:t> </a:t>
-            </a:r>
-            <a:r>
-              <a:rPr lang="en-US" err="1"/>
-              <a:t>normale</a:t>
-            </a:r>
-            <a:r>
-              <a:rPr lang="en-US"/>
-              <a:t> au CNRS</a:t>
-            </a:r>
-          </a:p>
-          <a:p>
-            <a:r>
-              <a:rPr lang="en-US"/>
-              <a:t>Je suis </a:t>
-            </a:r>
-            <a:r>
-              <a:rPr lang="en-US" err="1"/>
-              <a:t>actuellement</a:t>
-            </a:r>
-            <a:r>
-              <a:rPr lang="en-US"/>
-              <a:t> </a:t>
-            </a:r>
-            <a:r>
-              <a:rPr lang="en-US" err="1"/>
-              <a:t>en</a:t>
-            </a:r>
-            <a:r>
-              <a:rPr lang="en-US"/>
-              <a:t> </a:t>
-            </a:r>
-            <a:r>
-              <a:rPr lang="en-US" err="1"/>
-              <a:t>postdoctorat</a:t>
-            </a:r>
-            <a:r>
-              <a:rPr lang="en-US"/>
-              <a:t> </a:t>
-            </a:r>
-            <a:r>
-              <a:rPr lang="en-US" err="1"/>
-              <a:t>depuis</a:t>
-            </a:r>
-            <a:r>
-              <a:rPr lang="en-US"/>
-              <a:t> 2022 a </a:t>
-            </a:r>
-            <a:r>
-              <a:rPr lang="en-US" err="1"/>
-              <a:t>l’universite</a:t>
-            </a:r>
-            <a:r>
-              <a:rPr lang="en-US"/>
-              <a:t> de Cambridge. </a:t>
-            </a:r>
-            <a:r>
-              <a:rPr lang="en-US" err="1"/>
-              <a:t>Apres</a:t>
-            </a:r>
-            <a:r>
-              <a:rPr lang="en-US"/>
-              <a:t> un premier </a:t>
-            </a:r>
-            <a:r>
-              <a:rPr lang="en-US" err="1"/>
-              <a:t>doctorat</a:t>
-            </a:r>
-            <a:r>
-              <a:rPr lang="en-US"/>
-              <a:t> a </a:t>
-            </a:r>
-            <a:r>
-              <a:rPr lang="en-US" err="1"/>
-              <a:t>l’universi</a:t>
-            </a:r>
-            <a:r>
-              <a:rPr lang="en-US"/>
-              <a:t> entre 2020 et 2022, </a:t>
-            </a:r>
-            <a:r>
-              <a:rPr lang="en-US" err="1"/>
-              <a:t>suivant</a:t>
-            </a:r>
-            <a:r>
-              <a:rPr lang="en-US"/>
-              <a:t> ma these</a:t>
-            </a:r>
-          </a:p>
-          <a:p>
-            <a:endParaRPr lang="en-US"/>
-          </a:p>
-          <a:p>
-            <a:r>
-              <a:rPr lang="en-US" b="1"/>
-              <a:t>A quoi ca </a:t>
-            </a:r>
-            <a:r>
-              <a:rPr lang="en-US" b="1" err="1"/>
-              <a:t>sert</a:t>
-            </a:r>
-            <a:r>
-              <a:rPr lang="en-US" b="1"/>
-              <a:t> de verifier un </a:t>
-            </a:r>
-            <a:r>
-              <a:rPr lang="en-US" b="1" err="1"/>
-              <a:t>compilateur</a:t>
-            </a:r>
-            <a:endParaRPr lang="en-US" b="1"/>
-          </a:p>
-          <a:p>
-            <a:endParaRPr lang="en-US"/>
-          </a:p>
-          <a:p>
-            <a:r>
-              <a:rPr lang="en-US" err="1"/>
-              <a:t>Precedemment</a:t>
-            </a:r>
-            <a:r>
-              <a:rPr lang="en-US"/>
-              <a:t>, </a:t>
-            </a:r>
-            <a:r>
-              <a:rPr lang="en-US" err="1"/>
-              <a:t>j’etais</a:t>
-            </a:r>
-            <a:endParaRPr lang="en-US"/>
-          </a:p>
-          <a:p>
-            <a:endParaRPr lang="en-US"/>
-          </a:p>
-          <a:p>
-            <a:r>
-              <a:rPr lang="en-US"/>
-              <a:t>Pas </a:t>
-            </a:r>
-            <a:r>
-              <a:rPr lang="en-US" err="1"/>
-              <a:t>assez</a:t>
-            </a:r>
-            <a:r>
-              <a:rPr lang="en-US"/>
-              <a:t> </a:t>
-            </a:r>
-            <a:r>
-              <a:rPr lang="en-US" err="1"/>
-              <a:t>articule</a:t>
-            </a:r>
-            <a:endParaRPr lang="en-US"/>
-          </a:p>
-          <a:p>
-            <a:r>
-              <a:rPr lang="en-US"/>
-              <a:t>Je parle trop </a:t>
-            </a:r>
-            <a:r>
-              <a:rPr lang="en-US" err="1"/>
-              <a:t>vite</a:t>
-            </a:r>
-            <a:endParaRPr lang="en-US"/>
-          </a:p>
-          <a:p>
-            <a:endParaRPr lang="en-US"/>
-          </a:p>
-          <a:p>
-            <a:pPr marL="0" marR="0" lvl="0" indent="0" algn="l" defTabSz="914400" rtl="0" eaLnBrk="1" fontAlgn="auto" latinLnBrk="0" hangingPunct="1">
-              <a:lnSpc>
-                <a:spcPct val="100000"/>
-              </a:lnSpc>
-              <a:spcBef>
-                <a:spcPts val="0"/>
-              </a:spcBef>
-              <a:spcAft>
-                <a:spcPts val="0"/>
-              </a:spcAft>
-              <a:buClrTx/>
-              <a:buSzTx/>
-              <a:buFontTx/>
-              <a:buNone/>
-              <a:tabLst/>
-              <a:defRPr/>
-            </a:pPr>
-            <a:r>
-              <a:rPr lang="en-US" b="1" i="0" u="none" strike="noStrike">
-                <a:solidFill>
-                  <a:srgbClr val="1D7DCB"/>
-                </a:solidFill>
-                <a:effectLst/>
-                <a:latin typeface="Arial" panose="020B0604020202020204" pitchFamily="34" charset="0"/>
-                <a:hlinkClick r:id="rId3"/>
-              </a:rPr>
-              <a:t>Variable binding and substitution for (nameless) dummies</a:t>
-            </a:r>
-            <a:endParaRPr lang="en-US" b="1" i="0">
-              <a:solidFill>
-                <a:srgbClr val="2D2D2D"/>
-              </a:solidFill>
-              <a:effectLst/>
-              <a:latin typeface="Arial" panose="020B0604020202020204" pitchFamily="34" charset="0"/>
-            </a:endParaRPr>
-          </a:p>
-          <a:p>
-            <a:endParaRPr lang="fr-FR"/>
+            <a:endParaRPr lang="fr-FR" dirty="0"/>
           </a:p>
         </p:txBody>
       </p:sp>
@@ -4259,7 +3974,7 @@
           <a:p>
             <a:fld id="{5718F1CF-E24A-4F93-9D94-3391D23E1A3F}" type="datetime1">
               <a:rPr lang="en-US" smtClean="0"/>
-              <a:t>1/18/2024</a:t>
+              <a:t>1/20/2024</a:t>
             </a:fld>
             <a:endParaRPr lang="en-US"/>
           </a:p>
@@ -4427,7 +4142,7 @@
           <a:p>
             <a:fld id="{14B1C252-2FD2-4CF6-BEA4-64F6ACEC81B6}" type="datetime1">
               <a:rPr lang="en-US" smtClean="0"/>
-              <a:t>1/18/2024</a:t>
+              <a:t>1/20/2024</a:t>
             </a:fld>
             <a:endParaRPr lang="en-US"/>
           </a:p>
@@ -4605,7 +4320,7 @@
           <a:p>
             <a:fld id="{9C6DC07B-F885-4EF0-BFE3-5CEF464FDEE5}" type="datetime1">
               <a:rPr lang="en-US" smtClean="0"/>
-              <a:t>1/18/2024</a:t>
+              <a:t>1/20/2024</a:t>
             </a:fld>
             <a:endParaRPr lang="en-US"/>
           </a:p>
@@ -4773,7 +4488,7 @@
           <a:p>
             <a:fld id="{684D88E1-E6B1-4059-8068-9D5AC67622BD}" type="datetime1">
               <a:rPr lang="en-US" smtClean="0"/>
-              <a:t>1/18/2024</a:t>
+              <a:t>1/20/2024</a:t>
             </a:fld>
             <a:endParaRPr lang="en-US"/>
           </a:p>
@@ -5023,7 +4738,7 @@
           <a:p>
             <a:fld id="{84B318C2-4885-4368-AC7E-9ED2CC44021C}" type="datetime1">
               <a:rPr lang="en-US" smtClean="0"/>
-              <a:t>1/18/2024</a:t>
+              <a:t>1/20/2024</a:t>
             </a:fld>
             <a:endParaRPr lang="en-US"/>
           </a:p>
@@ -5257,7 +4972,7 @@
           <a:p>
             <a:fld id="{798AEC55-CDE0-44E2-B045-4EAAFC3EF908}" type="datetime1">
               <a:rPr lang="en-US" smtClean="0"/>
-              <a:t>1/18/2024</a:t>
+              <a:t>1/20/2024</a:t>
             </a:fld>
             <a:endParaRPr lang="en-US"/>
           </a:p>
@@ -5621,7 +5336,7 @@
           <a:p>
             <a:fld id="{BEA861E4-43F2-46CA-9352-165E2C1D8B7D}" type="datetime1">
               <a:rPr lang="en-US" smtClean="0"/>
-              <a:t>1/18/2024</a:t>
+              <a:t>1/20/2024</a:t>
             </a:fld>
             <a:endParaRPr lang="en-US"/>
           </a:p>
@@ -5738,7 +5453,7 @@
           <a:p>
             <a:fld id="{55D76E10-5C26-46E6-B32D-4547EFD6AACF}" type="datetime1">
               <a:rPr lang="en-US" smtClean="0"/>
-              <a:t>1/18/2024</a:t>
+              <a:t>1/20/2024</a:t>
             </a:fld>
             <a:endParaRPr lang="en-US"/>
           </a:p>
@@ -5833,7 +5548,7 @@
           <a:p>
             <a:fld id="{F42038C9-7F60-4F0E-A561-3EA9A3975D8E}" type="datetime1">
               <a:rPr lang="en-US" smtClean="0"/>
-              <a:t>1/18/2024</a:t>
+              <a:t>1/20/2024</a:t>
             </a:fld>
             <a:endParaRPr lang="en-US"/>
           </a:p>
@@ -6114,7 +5829,7 @@
           <a:p>
             <a:fld id="{6974F6F3-2ACF-43AE-8373-A35F96D22AE5}" type="datetime1">
               <a:rPr lang="en-US" smtClean="0"/>
-              <a:t>1/18/2024</a:t>
+              <a:t>1/20/2024</a:t>
             </a:fld>
             <a:endParaRPr lang="en-US"/>
           </a:p>
@@ -6370,7 +6085,7 @@
           <a:p>
             <a:fld id="{066AAB2D-6675-4C11-85D3-BA16F56F19A5}" type="datetime1">
               <a:rPr lang="en-US" smtClean="0"/>
-              <a:t>1/18/2024</a:t>
+              <a:t>1/20/2024</a:t>
             </a:fld>
             <a:endParaRPr lang="en-US"/>
           </a:p>
@@ -6581,7 +6296,7 @@
           <a:p>
             <a:fld id="{798F886D-A75D-4123-854D-3EEFBE63C074}" type="datetime1">
               <a:rPr lang="en-US" smtClean="0"/>
-              <a:t>1/18/2024</a:t>
+              <a:t>1/20/2024</a:t>
             </a:fld>
             <a:endParaRPr lang="en-US"/>
           </a:p>
@@ -7346,8 +7061,8 @@
           </a:p>
         </p:txBody>
       </p:sp>
-      <mc:AlternateContent xmlns:mc="http://schemas.openxmlformats.org/markup-compatibility/2006">
-        <mc:Choice xmlns:a14="http://schemas.microsoft.com/office/drawing/2010/main" Requires="a14">
+      <mc:AlternateContent xmlns:mc="http://schemas.openxmlformats.org/markup-compatibility/2006" xmlns:a14="http://schemas.microsoft.com/office/drawing/2010/main">
+        <mc:Choice Requires="a14">
           <p:sp>
             <p:nvSpPr>
               <p:cNvPr id="21" name="TextBox 20">
@@ -7426,7 +7141,7 @@
             </p:txBody>
           </p:sp>
         </mc:Choice>
-        <mc:Fallback>
+        <mc:Fallback xmlns="">
           <p:sp>
             <p:nvSpPr>
               <p:cNvPr id="21" name="TextBox 20">
@@ -7471,8 +7186,8 @@
           </p:sp>
         </mc:Fallback>
       </mc:AlternateContent>
-      <mc:AlternateContent xmlns:mc="http://schemas.openxmlformats.org/markup-compatibility/2006">
-        <mc:Choice xmlns:a14="http://schemas.microsoft.com/office/drawing/2010/main" Requires="a14">
+      <mc:AlternateContent xmlns:mc="http://schemas.openxmlformats.org/markup-compatibility/2006" xmlns:a14="http://schemas.microsoft.com/office/drawing/2010/main">
+        <mc:Choice Requires="a14">
           <p:sp>
             <p:nvSpPr>
               <p:cNvPr id="5" name="TextBox 4">
@@ -7702,7 +7417,7 @@
             </p:txBody>
           </p:sp>
         </mc:Choice>
-        <mc:Fallback>
+        <mc:Fallback xmlns="">
           <p:sp>
             <p:nvSpPr>
               <p:cNvPr id="5" name="TextBox 4">
@@ -8001,8 +7716,8 @@
           </a:p>
         </p:txBody>
       </p:sp>
-      <mc:AlternateContent xmlns:mc="http://schemas.openxmlformats.org/markup-compatibility/2006">
-        <mc:Choice xmlns:a14="http://schemas.microsoft.com/office/drawing/2010/main" Requires="a14">
+      <mc:AlternateContent xmlns:mc="http://schemas.openxmlformats.org/markup-compatibility/2006" xmlns:a14="http://schemas.microsoft.com/office/drawing/2010/main">
+        <mc:Choice Requires="a14">
           <p:sp>
             <p:nvSpPr>
               <p:cNvPr id="18" name="TextBox 17">
@@ -8031,6 +7746,7 @@
               </a:bodyPr>
               <a:lstStyle/>
               <a:p>
+                <a:pPr/>
                 <a14:m>
                   <m:oMathPara xmlns:m="http://schemas.openxmlformats.org/officeDocument/2006/math">
                     <m:oMathParaPr>
@@ -8137,7 +7853,7 @@
             </p:txBody>
           </p:sp>
         </mc:Choice>
-        <mc:Fallback>
+        <mc:Fallback xmlns="">
           <p:sp>
             <p:nvSpPr>
               <p:cNvPr id="18" name="TextBox 17">
@@ -9803,8 +9519,8 @@
           </a:p>
         </p:txBody>
       </p:sp>
-      <mc:AlternateContent xmlns:mc="http://schemas.openxmlformats.org/markup-compatibility/2006">
-        <mc:Choice xmlns:a14="http://schemas.microsoft.com/office/drawing/2010/main" Requires="a14">
+      <mc:AlternateContent xmlns:mc="http://schemas.openxmlformats.org/markup-compatibility/2006" xmlns:a14="http://schemas.microsoft.com/office/drawing/2010/main">
+        <mc:Choice Requires="a14">
           <p:sp>
             <p:nvSpPr>
               <p:cNvPr id="13" name="TextBox 12">
@@ -9927,7 +9643,7 @@
             </p:txBody>
           </p:sp>
         </mc:Choice>
-        <mc:Fallback>
+        <mc:Fallback xmlns="">
           <p:sp>
             <p:nvSpPr>
               <p:cNvPr id="13" name="TextBox 12">
@@ -10007,8 +9723,8 @@
           </a:p>
         </p:txBody>
       </p:sp>
-      <mc:AlternateContent xmlns:mc="http://schemas.openxmlformats.org/markup-compatibility/2006">
-        <mc:Choice xmlns:a14="http://schemas.microsoft.com/office/drawing/2010/main" Requires="a14">
+      <mc:AlternateContent xmlns:mc="http://schemas.openxmlformats.org/markup-compatibility/2006" xmlns:a14="http://schemas.microsoft.com/office/drawing/2010/main">
+        <mc:Choice Requires="a14">
           <p:sp>
             <p:nvSpPr>
               <p:cNvPr id="5" name="TextBox 4">
@@ -10177,7 +9893,7 @@
             </p:txBody>
           </p:sp>
         </mc:Choice>
-        <mc:Fallback>
+        <mc:Fallback xmlns="">
           <p:sp>
             <p:nvSpPr>
               <p:cNvPr id="5" name="TextBox 4">
@@ -15970,8 +15686,8 @@
           </a:fontRef>
         </p:style>
       </p:cxnSp>
-      <mc:AlternateContent xmlns:mc="http://schemas.openxmlformats.org/markup-compatibility/2006">
-        <mc:Choice xmlns:a14="http://schemas.microsoft.com/office/drawing/2010/main" Requires="a14">
+      <mc:AlternateContent xmlns:mc="http://schemas.openxmlformats.org/markup-compatibility/2006" xmlns:a14="http://schemas.microsoft.com/office/drawing/2010/main">
+        <mc:Choice Requires="a14">
           <p:sp>
             <p:nvSpPr>
               <p:cNvPr id="24" name="TextBox 23">
@@ -16000,6 +15716,7 @@
               </a:bodyPr>
               <a:lstStyle/>
               <a:p>
+                <a:pPr/>
                 <a14:m>
                   <m:oMathPara xmlns:m="http://schemas.openxmlformats.org/officeDocument/2006/math">
                     <m:oMathParaPr>
@@ -16317,7 +16034,7 @@
             </p:txBody>
           </p:sp>
         </mc:Choice>
-        <mc:Fallback>
+        <mc:Fallback xmlns="">
           <p:sp>
             <p:nvSpPr>
               <p:cNvPr id="24" name="TextBox 23">
@@ -22901,15 +22618,6 @@
 </file>
 
 <file path=customXml/item1.xml><?xml version="1.0" encoding="utf-8"?>
-<?mso-contentType ?>
-<FormTemplates xmlns="http://schemas.microsoft.com/sharepoint/v3/contenttype/forms">
-  <Display>DocumentLibraryForm</Display>
-  <Edit>DocumentLibraryForm</Edit>
-  <New>DocumentLibraryForm</New>
-</FormTemplates>
-</file>
-
-<file path=customXml/item2.xml><?xml version="1.0" encoding="utf-8"?>
 <ct:contentTypeSchema xmlns:ct="http://schemas.microsoft.com/office/2006/metadata/contentType" xmlns:ma="http://schemas.microsoft.com/office/2006/metadata/properties/metaAttributes" ct:_="" ma:_="" ma:contentTypeName="Document" ma:contentTypeID="0x010100F676E5E997EA2A4F96CD3A278615439B" ma:contentTypeVersion="3" ma:contentTypeDescription="Crée un document." ma:contentTypeScope="" ma:versionID="f259d1fd0ee8b83488bf8d793ade9b6a">
   <xsd:schema xmlns:xsd="http://www.w3.org/2001/XMLSchema" xmlns:xs="http://www.w3.org/2001/XMLSchema" xmlns:p="http://schemas.microsoft.com/office/2006/metadata/properties" xmlns:ns3="e197be8d-da98-4dfc-a05a-43e33b16f0db" targetNamespace="http://schemas.microsoft.com/office/2006/metadata/properties" ma:root="true" ma:fieldsID="29927682aa6624eadcb13e8c0d653a78" ns3:_="">
     <xsd:import namespace="e197be8d-da98-4dfc-a05a-43e33b16f0db"/>
@@ -23047,6 +22755,15 @@
 </ct:contentTypeSchema>
 </file>
 
+<file path=customXml/item2.xml><?xml version="1.0" encoding="utf-8"?>
+<?mso-contentType ?>
+<FormTemplates xmlns="http://schemas.microsoft.com/sharepoint/v3/contenttype/forms">
+  <Display>DocumentLibraryForm</Display>
+  <Edit>DocumentLibraryForm</Edit>
+  <New>DocumentLibraryForm</New>
+</FormTemplates>
+</file>
+
 <file path=customXml/item3.xml><?xml version="1.0" encoding="utf-8"?>
 <p:properties xmlns:p="http://schemas.microsoft.com/office/2006/metadata/properties" xmlns:xsi="http://www.w3.org/2001/XMLSchema-instance" xmlns:pc="http://schemas.microsoft.com/office/infopath/2007/PartnerControls">
   <documentManagement/>
@@ -23054,14 +22771,6 @@
 </file>
 
 <file path=customXml/itemProps1.xml><?xml version="1.0" encoding="utf-8"?>
-<ds:datastoreItem xmlns:ds="http://schemas.openxmlformats.org/officeDocument/2006/customXml" ds:itemID="{FFFD09D8-C434-475F-A831-E93F50798887}">
-  <ds:schemaRefs>
-    <ds:schemaRef ds:uri="http://schemas.microsoft.com/sharepoint/v3/contenttype/forms"/>
-  </ds:schemaRefs>
-</ds:datastoreItem>
-</file>
-
-<file path=customXml/itemProps2.xml><?xml version="1.0" encoding="utf-8"?>
 <ds:datastoreItem xmlns:ds="http://schemas.openxmlformats.org/officeDocument/2006/customXml" ds:itemID="{9109D6F1-2622-42D4-A7F2-1532BEB42127}">
   <ds:schemaRefs>
     <ds:schemaRef ds:uri="http://schemas.microsoft.com/office/2006/metadata/contentType"/>
@@ -23075,6 +22784,14 @@
     <ds:schemaRef ds:uri="http://purl.org/dc/elements/1.1/"/>
     <ds:schemaRef ds:uri="http://purl.org/dc/terms/"/>
     <ds:schemaRef ds:uri="http://schemas.microsoft.com/internal/obd"/>
+  </ds:schemaRefs>
+</ds:datastoreItem>
+</file>
+
+<file path=customXml/itemProps2.xml><?xml version="1.0" encoding="utf-8"?>
+<ds:datastoreItem xmlns:ds="http://schemas.openxmlformats.org/officeDocument/2006/customXml" ds:itemID="{FFFD09D8-C434-475F-A831-E93F50798887}">
+  <ds:schemaRefs>
+    <ds:schemaRef ds:uri="http://schemas.microsoft.com/sharepoint/v3/contenttype/forms"/>
   </ds:schemaRefs>
 </ds:datastoreItem>
 </file>

</xml_diff>